<commit_message>
+ Updating 4th corner models
</commit_message>
<xml_diff>
--- a/outputs_figures/ms_figures/fig5_model_traits_comp/fig5_model_comp.pptx
+++ b/outputs_figures/ms_figures/fig5_model_traits_comp/fig5_model_comp.pptx
@@ -6,7 +6,8 @@
   </p:sldMasterIdLst>
   <p:sldIdLst>
     <p:sldId id="257" r:id="rId2"/>
-    <p:sldId id="256" r:id="rId3"/>
+    <p:sldId id="258" r:id="rId3"/>
+    <p:sldId id="256" r:id="rId4"/>
   </p:sldIdLst>
   <p:sldSz cx="12192000" cy="6858000"/>
   <p:notesSz cx="6858000" cy="9144000"/>
@@ -260,7 +261,7 @@
           <a:p>
             <a:fld id="{38DB27A7-4282-8240-8C28-0071C9F92F15}" type="datetimeFigureOut">
               <a:rPr lang="en-US" smtClean="0"/>
-              <a:t>6/14/22</a:t>
+              <a:t>9/8/22</a:t>
             </a:fld>
             <a:endParaRPr lang="en-US"/>
           </a:p>
@@ -458,7 +459,7 @@
           <a:p>
             <a:fld id="{38DB27A7-4282-8240-8C28-0071C9F92F15}" type="datetimeFigureOut">
               <a:rPr lang="en-US" smtClean="0"/>
-              <a:t>6/14/22</a:t>
+              <a:t>9/8/22</a:t>
             </a:fld>
             <a:endParaRPr lang="en-US"/>
           </a:p>
@@ -666,7 +667,7 @@
           <a:p>
             <a:fld id="{38DB27A7-4282-8240-8C28-0071C9F92F15}" type="datetimeFigureOut">
               <a:rPr lang="en-US" smtClean="0"/>
-              <a:t>6/14/22</a:t>
+              <a:t>9/8/22</a:t>
             </a:fld>
             <a:endParaRPr lang="en-US"/>
           </a:p>
@@ -864,7 +865,7 @@
           <a:p>
             <a:fld id="{38DB27A7-4282-8240-8C28-0071C9F92F15}" type="datetimeFigureOut">
               <a:rPr lang="en-US" smtClean="0"/>
-              <a:t>6/14/22</a:t>
+              <a:t>9/8/22</a:t>
             </a:fld>
             <a:endParaRPr lang="en-US"/>
           </a:p>
@@ -1139,7 +1140,7 @@
           <a:p>
             <a:fld id="{38DB27A7-4282-8240-8C28-0071C9F92F15}" type="datetimeFigureOut">
               <a:rPr lang="en-US" smtClean="0"/>
-              <a:t>6/14/22</a:t>
+              <a:t>9/8/22</a:t>
             </a:fld>
             <a:endParaRPr lang="en-US"/>
           </a:p>
@@ -1404,7 +1405,7 @@
           <a:p>
             <a:fld id="{38DB27A7-4282-8240-8C28-0071C9F92F15}" type="datetimeFigureOut">
               <a:rPr lang="en-US" smtClean="0"/>
-              <a:t>6/14/22</a:t>
+              <a:t>9/8/22</a:t>
             </a:fld>
             <a:endParaRPr lang="en-US"/>
           </a:p>
@@ -1816,7 +1817,7 @@
           <a:p>
             <a:fld id="{38DB27A7-4282-8240-8C28-0071C9F92F15}" type="datetimeFigureOut">
               <a:rPr lang="en-US" smtClean="0"/>
-              <a:t>6/14/22</a:t>
+              <a:t>9/8/22</a:t>
             </a:fld>
             <a:endParaRPr lang="en-US"/>
           </a:p>
@@ -1957,7 +1958,7 @@
           <a:p>
             <a:fld id="{38DB27A7-4282-8240-8C28-0071C9F92F15}" type="datetimeFigureOut">
               <a:rPr lang="en-US" smtClean="0"/>
-              <a:t>6/14/22</a:t>
+              <a:t>9/8/22</a:t>
             </a:fld>
             <a:endParaRPr lang="en-US"/>
           </a:p>
@@ -2070,7 +2071,7 @@
           <a:p>
             <a:fld id="{38DB27A7-4282-8240-8C28-0071C9F92F15}" type="datetimeFigureOut">
               <a:rPr lang="en-US" smtClean="0"/>
-              <a:t>6/14/22</a:t>
+              <a:t>9/8/22</a:t>
             </a:fld>
             <a:endParaRPr lang="en-US"/>
           </a:p>
@@ -2381,7 +2382,7 @@
           <a:p>
             <a:fld id="{38DB27A7-4282-8240-8C28-0071C9F92F15}" type="datetimeFigureOut">
               <a:rPr lang="en-US" smtClean="0"/>
-              <a:t>6/14/22</a:t>
+              <a:t>9/8/22</a:t>
             </a:fld>
             <a:endParaRPr lang="en-US"/>
           </a:p>
@@ -2669,7 +2670,7 @@
           <a:p>
             <a:fld id="{38DB27A7-4282-8240-8C28-0071C9F92F15}" type="datetimeFigureOut">
               <a:rPr lang="en-US" smtClean="0"/>
-              <a:t>6/14/22</a:t>
+              <a:t>9/8/22</a:t>
             </a:fld>
             <a:endParaRPr lang="en-US"/>
           </a:p>
@@ -2910,7 +2911,7 @@
           <a:p>
             <a:fld id="{38DB27A7-4282-8240-8C28-0071C9F92F15}" type="datetimeFigureOut">
               <a:rPr lang="en-US" smtClean="0"/>
-              <a:t>6/14/22</a:t>
+              <a:t>9/8/22</a:t>
             </a:fld>
             <a:endParaRPr lang="en-US"/>
           </a:p>
@@ -3669,6 +3670,333 @@
 <file path=ppt/slides/slide2.xml><?xml version="1.0" encoding="utf-8"?>
 <p:sld xmlns:a="http://schemas.openxmlformats.org/drawingml/2006/main" xmlns:r="http://schemas.openxmlformats.org/officeDocument/2006/relationships" xmlns:p="http://schemas.openxmlformats.org/presentationml/2006/main">
   <p:cSld>
+    <p:bg>
+      <p:bgPr>
+        <a:solidFill>
+          <a:schemeClr val="bg1"/>
+        </a:solidFill>
+        <a:effectLst/>
+      </p:bgPr>
+    </p:bg>
+    <p:spTree>
+      <p:nvGrpSpPr>
+        <p:cNvPr id="1" name=""/>
+        <p:cNvGrpSpPr/>
+        <p:nvPr/>
+      </p:nvGrpSpPr>
+      <p:grpSpPr>
+        <a:xfrm>
+          <a:off x="0" y="0"/>
+          <a:ext cx="0" cy="0"/>
+          <a:chOff x="0" y="0"/>
+          <a:chExt cx="0" cy="0"/>
+        </a:xfrm>
+      </p:grpSpPr>
+      <p:sp>
+        <p:nvSpPr>
+          <p:cNvPr id="12" name="Rectangle 11">
+            <a:extLst>
+              <a:ext uri="{FF2B5EF4-FFF2-40B4-BE49-F238E27FC236}">
+                <a16:creationId xmlns:a16="http://schemas.microsoft.com/office/drawing/2014/main" id="{A9F529C3-C941-49FD-8C67-82F134F64BDB}"/>
+              </a:ext>
+              <a:ext uri="{C183D7F6-B498-43B3-948B-1728B52AA6E4}">
+                <adec:decorative xmlns:adec="http://schemas.microsoft.com/office/drawing/2017/decorative" val="1"/>
+              </a:ext>
+            </a:extLst>
+          </p:cNvPr>
+          <p:cNvSpPr>
+            <a:spLocks noGrp="1" noRot="1" noChangeAspect="1" noMove="1" noResize="1" noEditPoints="1" noAdjustHandles="1" noChangeArrowheads="1" noChangeShapeType="1" noTextEdit="1"/>
+          </p:cNvSpPr>
+          <p:nvPr>
+            <p:extLst>
+              <p:ext uri="{386F3935-93C4-4BCD-93E2-E3B085C9AB24}">
+                <p16:designElem xmlns:p16="http://schemas.microsoft.com/office/powerpoint/2015/main" val="1"/>
+              </p:ext>
+            </p:extLst>
+          </p:nvPr>
+        </p:nvSpPr>
+        <p:spPr>
+          <a:xfrm>
+            <a:off x="0" y="0"/>
+            <a:ext cx="12192000" cy="6858000"/>
+          </a:xfrm>
+          <a:prstGeom prst="rect">
+            <a:avLst/>
+          </a:prstGeom>
+          <a:solidFill>
+            <a:schemeClr val="tx1">
+              <a:lumMod val="50000"/>
+              <a:lumOff val="50000"/>
+              <a:alpha val="30000"/>
+            </a:schemeClr>
+          </a:solidFill>
+          <a:ln>
+            <a:noFill/>
+          </a:ln>
+        </p:spPr>
+        <p:style>
+          <a:lnRef idx="2">
+            <a:schemeClr val="accent1">
+              <a:shade val="50000"/>
+            </a:schemeClr>
+          </a:lnRef>
+          <a:fillRef idx="1">
+            <a:schemeClr val="accent1"/>
+          </a:fillRef>
+          <a:effectRef idx="0">
+            <a:schemeClr val="accent1"/>
+          </a:effectRef>
+          <a:fontRef idx="minor">
+            <a:schemeClr val="lt1"/>
+          </a:fontRef>
+        </p:style>
+        <p:txBody>
+          <a:bodyPr rtlCol="0" anchor="ctr"/>
+          <a:lstStyle/>
+          <a:p>
+            <a:pPr algn="ctr"/>
+            <a:endParaRPr lang="en-US"/>
+          </a:p>
+        </p:txBody>
+      </p:sp>
+      <p:sp>
+        <p:nvSpPr>
+          <p:cNvPr id="14" name="Rectangle 13">
+            <a:extLst>
+              <a:ext uri="{FF2B5EF4-FFF2-40B4-BE49-F238E27FC236}">
+                <a16:creationId xmlns:a16="http://schemas.microsoft.com/office/drawing/2014/main" id="{20586029-32A0-47E5-9AEC-AE3ABA6B94D0}"/>
+              </a:ext>
+              <a:ext uri="{C183D7F6-B498-43B3-948B-1728B52AA6E4}">
+                <adec:decorative xmlns:adec="http://schemas.microsoft.com/office/drawing/2017/decorative" val="1"/>
+              </a:ext>
+            </a:extLst>
+          </p:cNvPr>
+          <p:cNvSpPr>
+            <a:spLocks noGrp="1" noRot="1" noChangeAspect="1" noMove="1" noResize="1" noEditPoints="1" noAdjustHandles="1" noChangeArrowheads="1" noChangeShapeType="1" noTextEdit="1"/>
+          </p:cNvSpPr>
+          <p:nvPr>
+            <p:extLst>
+              <p:ext uri="{386F3935-93C4-4BCD-93E2-E3B085C9AB24}">
+                <p16:designElem xmlns:p16="http://schemas.microsoft.com/office/powerpoint/2015/main" val="1"/>
+              </p:ext>
+            </p:extLst>
+          </p:nvPr>
+        </p:nvSpPr>
+        <p:spPr>
+          <a:xfrm>
+            <a:off x="477012" y="480060"/>
+            <a:ext cx="11237976" cy="5897880"/>
+          </a:xfrm>
+          <a:prstGeom prst="rect">
+            <a:avLst/>
+          </a:prstGeom>
+          <a:solidFill>
+            <a:srgbClr val="FFFFFF"/>
+          </a:solidFill>
+          <a:ln w="9525">
+            <a:noFill/>
+          </a:ln>
+          <a:effectLst>
+            <a:outerShdw blurRad="63500" dist="17780" dir="5400000" algn="t" rotWithShape="0">
+              <a:prstClr val="black">
+                <a:alpha val="43000"/>
+              </a:prstClr>
+            </a:outerShdw>
+          </a:effectLst>
+        </p:spPr>
+        <p:style>
+          <a:lnRef idx="2">
+            <a:schemeClr val="accent1">
+              <a:shade val="50000"/>
+            </a:schemeClr>
+          </a:lnRef>
+          <a:fillRef idx="1">
+            <a:schemeClr val="accent1"/>
+          </a:fillRef>
+          <a:effectRef idx="0">
+            <a:schemeClr val="accent1"/>
+          </a:effectRef>
+          <a:fontRef idx="minor">
+            <a:schemeClr val="lt1"/>
+          </a:fontRef>
+        </p:style>
+        <p:txBody>
+          <a:bodyPr rtlCol="0" anchor="ctr"/>
+          <a:lstStyle/>
+          <a:p>
+            <a:pPr algn="ctr"/>
+            <a:endParaRPr lang="en-US"/>
+          </a:p>
+        </p:txBody>
+      </p:sp>
+      <p:pic>
+        <p:nvPicPr>
+          <p:cNvPr id="7" name="Picture 6">
+            <a:extLst>
+              <a:ext uri="{FF2B5EF4-FFF2-40B4-BE49-F238E27FC236}">
+                <a16:creationId xmlns:a16="http://schemas.microsoft.com/office/drawing/2014/main" id="{00738BF7-D0A5-9A0F-A4A7-C1BE7EF07A65}"/>
+              </a:ext>
+            </a:extLst>
+          </p:cNvPr>
+          <p:cNvPicPr>
+            <a:picLocks noChangeAspect="1"/>
+          </p:cNvPicPr>
+          <p:nvPr/>
+        </p:nvPicPr>
+        <p:blipFill>
+          <a:blip r:embed="rId2"/>
+          <a:stretch>
+            <a:fillRect/>
+          </a:stretch>
+        </p:blipFill>
+        <p:spPr>
+          <a:xfrm>
+            <a:off x="643467" y="1664094"/>
+            <a:ext cx="5294716" cy="3529810"/>
+          </a:xfrm>
+          <a:prstGeom prst="rect">
+            <a:avLst/>
+          </a:prstGeom>
+        </p:spPr>
+      </p:pic>
+      <p:cxnSp>
+        <p:nvCxnSpPr>
+          <p:cNvPr id="16" name="Straight Connector 15">
+            <a:extLst>
+              <a:ext uri="{FF2B5EF4-FFF2-40B4-BE49-F238E27FC236}">
+                <a16:creationId xmlns:a16="http://schemas.microsoft.com/office/drawing/2014/main" id="{8C730EAB-A532-4295-A302-FB4B90DB9F5E}"/>
+              </a:ext>
+              <a:ext uri="{C183D7F6-B498-43B3-948B-1728B52AA6E4}">
+                <adec:decorative xmlns:adec="http://schemas.microsoft.com/office/drawing/2017/decorative" val="1"/>
+              </a:ext>
+            </a:extLst>
+          </p:cNvPr>
+          <p:cNvCxnSpPr>
+            <a:cxnSpLocks noGrp="1" noRot="1" noChangeAspect="1" noMove="1" noResize="1" noEditPoints="1" noAdjustHandles="1" noChangeArrowheads="1" noChangeShapeType="1"/>
+          </p:cNvCxnSpPr>
+          <p:nvPr>
+            <p:extLst>
+              <p:ext uri="{386F3935-93C4-4BCD-93E2-E3B085C9AB24}">
+                <p16:designElem xmlns:p16="http://schemas.microsoft.com/office/powerpoint/2015/main" val="1"/>
+              </p:ext>
+            </p:extLst>
+          </p:nvPr>
+        </p:nvCxnSpPr>
+        <p:spPr>
+          <a:xfrm>
+            <a:off x="6079958" y="1143000"/>
+            <a:ext cx="0" cy="4572000"/>
+          </a:xfrm>
+          <a:prstGeom prst="line">
+            <a:avLst/>
+          </a:prstGeom>
+          <a:ln>
+            <a:solidFill>
+              <a:srgbClr val="4E4E4E"/>
+            </a:solidFill>
+          </a:ln>
+        </p:spPr>
+        <p:style>
+          <a:lnRef idx="1">
+            <a:schemeClr val="accent1"/>
+          </a:lnRef>
+          <a:fillRef idx="0">
+            <a:schemeClr val="accent1"/>
+          </a:fillRef>
+          <a:effectRef idx="0">
+            <a:schemeClr val="accent1"/>
+          </a:effectRef>
+          <a:fontRef idx="minor">
+            <a:schemeClr val="tx1"/>
+          </a:fontRef>
+        </p:style>
+      </p:cxnSp>
+      <p:sp>
+        <p:nvSpPr>
+          <p:cNvPr id="11" name="TextBox 10">
+            <a:extLst>
+              <a:ext uri="{FF2B5EF4-FFF2-40B4-BE49-F238E27FC236}">
+                <a16:creationId xmlns:a16="http://schemas.microsoft.com/office/drawing/2014/main" id="{CF5224C9-7041-90D5-4A23-17E9AAA0FE12}"/>
+              </a:ext>
+            </a:extLst>
+          </p:cNvPr>
+          <p:cNvSpPr txBox="1"/>
+          <p:nvPr/>
+        </p:nvSpPr>
+        <p:spPr>
+          <a:xfrm>
+            <a:off x="643467" y="1263984"/>
+            <a:ext cx="471487" cy="400110"/>
+          </a:xfrm>
+          <a:prstGeom prst="rect">
+            <a:avLst/>
+          </a:prstGeom>
+          <a:noFill/>
+        </p:spPr>
+        <p:txBody>
+          <a:bodyPr wrap="square" rtlCol="0">
+            <a:spAutoFit/>
+          </a:bodyPr>
+          <a:lstStyle/>
+          <a:p>
+            <a:r>
+              <a:rPr lang="en-US" sz="2000" dirty="0"/>
+              <a:t>a)</a:t>
+            </a:r>
+          </a:p>
+        </p:txBody>
+      </p:sp>
+      <p:sp>
+        <p:nvSpPr>
+          <p:cNvPr id="13" name="TextBox 12">
+            <a:extLst>
+              <a:ext uri="{FF2B5EF4-FFF2-40B4-BE49-F238E27FC236}">
+                <a16:creationId xmlns:a16="http://schemas.microsoft.com/office/drawing/2014/main" id="{E1863CE6-19C2-1E4B-B44C-6B953C318EED}"/>
+              </a:ext>
+            </a:extLst>
+          </p:cNvPr>
+          <p:cNvSpPr txBox="1"/>
+          <p:nvPr/>
+        </p:nvSpPr>
+        <p:spPr>
+          <a:xfrm>
+            <a:off x="6246413" y="1263984"/>
+            <a:ext cx="471487" cy="400110"/>
+          </a:xfrm>
+          <a:prstGeom prst="rect">
+            <a:avLst/>
+          </a:prstGeom>
+          <a:noFill/>
+        </p:spPr>
+        <p:txBody>
+          <a:bodyPr wrap="square" rtlCol="0">
+            <a:spAutoFit/>
+          </a:bodyPr>
+          <a:lstStyle/>
+          <a:p>
+            <a:r>
+              <a:rPr lang="en-US" sz="2000" dirty="0"/>
+              <a:t>b)</a:t>
+            </a:r>
+          </a:p>
+        </p:txBody>
+      </p:sp>
+    </p:spTree>
+    <p:extLst>
+      <p:ext uri="{BB962C8B-B14F-4D97-AF65-F5344CB8AC3E}">
+        <p14:creationId xmlns:p14="http://schemas.microsoft.com/office/powerpoint/2010/main" val="1944765037"/>
+      </p:ext>
+    </p:extLst>
+  </p:cSld>
+  <p:clrMapOvr>
+    <a:masterClrMapping/>
+  </p:clrMapOvr>
+</p:sld>
+</file>
+
+<file path=ppt/slides/slide3.xml><?xml version="1.0" encoding="utf-8"?>
+<p:sld xmlns:a="http://schemas.openxmlformats.org/drawingml/2006/main" xmlns:r="http://schemas.openxmlformats.org/officeDocument/2006/relationships" xmlns:p="http://schemas.openxmlformats.org/presentationml/2006/main">
+  <p:cSld>
     <p:spTree>
       <p:nvGrpSpPr>
         <p:cNvPr id="1" name=""/>

</xml_diff>

<commit_message>
+ Updating outputs and code
</commit_message>
<xml_diff>
--- a/outputs_figures/ms_figures/fig5_model_traits_comp/fig5_model_comp.pptx
+++ b/outputs_figures/ms_figures/fig5_model_traits_comp/fig5_model_comp.pptx
@@ -3829,36 +3829,6 @@
           </a:p>
         </p:txBody>
       </p:sp>
-      <p:pic>
-        <p:nvPicPr>
-          <p:cNvPr id="7" name="Picture 6">
-            <a:extLst>
-              <a:ext uri="{FF2B5EF4-FFF2-40B4-BE49-F238E27FC236}">
-                <a16:creationId xmlns:a16="http://schemas.microsoft.com/office/drawing/2014/main" id="{00738BF7-D0A5-9A0F-A4A7-C1BE7EF07A65}"/>
-              </a:ext>
-            </a:extLst>
-          </p:cNvPr>
-          <p:cNvPicPr>
-            <a:picLocks noChangeAspect="1"/>
-          </p:cNvPicPr>
-          <p:nvPr/>
-        </p:nvPicPr>
-        <p:blipFill>
-          <a:blip r:embed="rId2"/>
-          <a:stretch>
-            <a:fillRect/>
-          </a:stretch>
-        </p:blipFill>
-        <p:spPr>
-          <a:xfrm>
-            <a:off x="643467" y="1664094"/>
-            <a:ext cx="5294716" cy="3529810"/>
-          </a:xfrm>
-          <a:prstGeom prst="rect">
-            <a:avLst/>
-          </a:prstGeom>
-        </p:spPr>
-      </p:pic>
       <p:cxnSp>
         <p:nvCxnSpPr>
           <p:cNvPr id="16" name="Straight Connector 15">
@@ -3981,6 +3951,36 @@
           </a:p>
         </p:txBody>
       </p:sp>
+      <p:pic>
+        <p:nvPicPr>
+          <p:cNvPr id="3" name="Picture 2">
+            <a:extLst>
+              <a:ext uri="{FF2B5EF4-FFF2-40B4-BE49-F238E27FC236}">
+                <a16:creationId xmlns:a16="http://schemas.microsoft.com/office/drawing/2014/main" id="{910C00C5-8B49-F924-F296-E8135250D260}"/>
+              </a:ext>
+            </a:extLst>
+          </p:cNvPr>
+          <p:cNvPicPr>
+            <a:picLocks noChangeAspect="1"/>
+          </p:cNvPicPr>
+          <p:nvPr/>
+        </p:nvPicPr>
+        <p:blipFill>
+          <a:blip r:embed="rId2"/>
+          <a:stretch>
+            <a:fillRect/>
+          </a:stretch>
+        </p:blipFill>
+        <p:spPr>
+          <a:xfrm>
+            <a:off x="933902" y="1710420"/>
+            <a:ext cx="4907550" cy="3271700"/>
+          </a:xfrm>
+          <a:prstGeom prst="rect">
+            <a:avLst/>
+          </a:prstGeom>
+        </p:spPr>
+      </p:pic>
     </p:spTree>
     <p:extLst>
       <p:ext uri="{BB962C8B-B14F-4D97-AF65-F5344CB8AC3E}">

</xml_diff>

<commit_message>
+ Editing Figures 4 and 5
</commit_message>
<xml_diff>
--- a/outputs_figures/ms_figures/fig5_model_traits_comp/fig5_model_comp.pptx
+++ b/outputs_figures/ms_figures/fig5_model_traits_comp/fig5_model_comp.pptx
@@ -4,10 +4,13 @@
   <p:sldMasterIdLst>
     <p:sldMasterId id="2147483648" r:id="rId1"/>
   </p:sldMasterIdLst>
+  <p:notesMasterIdLst>
+    <p:notesMasterId r:id="rId5"/>
+  </p:notesMasterIdLst>
   <p:sldIdLst>
-    <p:sldId id="257" r:id="rId2"/>
-    <p:sldId id="258" r:id="rId3"/>
-    <p:sldId id="256" r:id="rId4"/>
+    <p:sldId id="256" r:id="rId2"/>
+    <p:sldId id="257" r:id="rId3"/>
+    <p:sldId id="258" r:id="rId4"/>
   </p:sldIdLst>
   <p:sldSz cx="12192000" cy="6858000"/>
   <p:notesSz cx="6858000" cy="9144000"/>
@@ -114,6 +117,439 @@
 </p:presentation>
 </file>
 
+<file path=ppt/notesMasters/notesMaster1.xml><?xml version="1.0" encoding="utf-8"?>
+<p:notesMaster xmlns:a="http://schemas.openxmlformats.org/drawingml/2006/main" xmlns:r="http://schemas.openxmlformats.org/officeDocument/2006/relationships" xmlns:p="http://schemas.openxmlformats.org/presentationml/2006/main">
+  <p:cSld>
+    <p:bg>
+      <p:bgRef idx="1001">
+        <a:schemeClr val="bg1"/>
+      </p:bgRef>
+    </p:bg>
+    <p:spTree>
+      <p:nvGrpSpPr>
+        <p:cNvPr id="1" name=""/>
+        <p:cNvGrpSpPr/>
+        <p:nvPr/>
+      </p:nvGrpSpPr>
+      <p:grpSpPr>
+        <a:xfrm>
+          <a:off x="0" y="0"/>
+          <a:ext cx="0" cy="0"/>
+          <a:chOff x="0" y="0"/>
+          <a:chExt cx="0" cy="0"/>
+        </a:xfrm>
+      </p:grpSpPr>
+      <p:sp>
+        <p:nvSpPr>
+          <p:cNvPr id="2" name="Header Placeholder 1"/>
+          <p:cNvSpPr>
+            <a:spLocks noGrp="1"/>
+          </p:cNvSpPr>
+          <p:nvPr>
+            <p:ph type="hdr" sz="quarter"/>
+          </p:nvPr>
+        </p:nvSpPr>
+        <p:spPr>
+          <a:xfrm>
+            <a:off x="0" y="0"/>
+            <a:ext cx="2971800" cy="458788"/>
+          </a:xfrm>
+          <a:prstGeom prst="rect">
+            <a:avLst/>
+          </a:prstGeom>
+        </p:spPr>
+        <p:txBody>
+          <a:bodyPr vert="horz" lIns="91440" tIns="45720" rIns="91440" bIns="45720" rtlCol="0"/>
+          <a:lstStyle>
+            <a:lvl1pPr algn="l">
+              <a:defRPr sz="1200"/>
+            </a:lvl1pPr>
+          </a:lstStyle>
+          <a:p>
+            <a:endParaRPr lang="en-US"/>
+          </a:p>
+        </p:txBody>
+      </p:sp>
+      <p:sp>
+        <p:nvSpPr>
+          <p:cNvPr id="3" name="Date Placeholder 2"/>
+          <p:cNvSpPr>
+            <a:spLocks noGrp="1"/>
+          </p:cNvSpPr>
+          <p:nvPr>
+            <p:ph type="dt" idx="1"/>
+          </p:nvPr>
+        </p:nvSpPr>
+        <p:spPr>
+          <a:xfrm>
+            <a:off x="3884613" y="0"/>
+            <a:ext cx="2971800" cy="458788"/>
+          </a:xfrm>
+          <a:prstGeom prst="rect">
+            <a:avLst/>
+          </a:prstGeom>
+        </p:spPr>
+        <p:txBody>
+          <a:bodyPr vert="horz" lIns="91440" tIns="45720" rIns="91440" bIns="45720" rtlCol="0"/>
+          <a:lstStyle>
+            <a:lvl1pPr algn="r">
+              <a:defRPr sz="1200"/>
+            </a:lvl1pPr>
+          </a:lstStyle>
+          <a:p>
+            <a:fld id="{5E7D029C-DB88-1640-B96D-80D2C14B18B1}" type="datetimeFigureOut">
+              <a:rPr lang="en-US" smtClean="0"/>
+              <a:t>11/26/22</a:t>
+            </a:fld>
+            <a:endParaRPr lang="en-US"/>
+          </a:p>
+        </p:txBody>
+      </p:sp>
+      <p:sp>
+        <p:nvSpPr>
+          <p:cNvPr id="4" name="Slide Image Placeholder 3"/>
+          <p:cNvSpPr>
+            <a:spLocks noGrp="1" noRot="1" noChangeAspect="1"/>
+          </p:cNvSpPr>
+          <p:nvPr>
+            <p:ph type="sldImg" idx="2"/>
+          </p:nvPr>
+        </p:nvSpPr>
+        <p:spPr>
+          <a:xfrm>
+            <a:off x="685800" y="1143000"/>
+            <a:ext cx="5486400" cy="3086100"/>
+          </a:xfrm>
+          <a:prstGeom prst="rect">
+            <a:avLst/>
+          </a:prstGeom>
+          <a:noFill/>
+          <a:ln w="12700">
+            <a:solidFill>
+              <a:prstClr val="black"/>
+            </a:solidFill>
+          </a:ln>
+        </p:spPr>
+        <p:txBody>
+          <a:bodyPr vert="horz" lIns="91440" tIns="45720" rIns="91440" bIns="45720" rtlCol="0" anchor="ctr"/>
+          <a:lstStyle/>
+          <a:p>
+            <a:endParaRPr lang="en-US"/>
+          </a:p>
+        </p:txBody>
+      </p:sp>
+      <p:sp>
+        <p:nvSpPr>
+          <p:cNvPr id="5" name="Notes Placeholder 4"/>
+          <p:cNvSpPr>
+            <a:spLocks noGrp="1"/>
+          </p:cNvSpPr>
+          <p:nvPr>
+            <p:ph type="body" sz="quarter" idx="3"/>
+          </p:nvPr>
+        </p:nvSpPr>
+        <p:spPr>
+          <a:xfrm>
+            <a:off x="685800" y="4400550"/>
+            <a:ext cx="5486400" cy="3600450"/>
+          </a:xfrm>
+          <a:prstGeom prst="rect">
+            <a:avLst/>
+          </a:prstGeom>
+        </p:spPr>
+        <p:txBody>
+          <a:bodyPr vert="horz" lIns="91440" tIns="45720" rIns="91440" bIns="45720" rtlCol="0"/>
+          <a:lstStyle/>
+          <a:p>
+            <a:pPr lvl="0"/>
+            <a:r>
+              <a:rPr lang="en-US"/>
+              <a:t>Click to edit Master text styles</a:t>
+            </a:r>
+          </a:p>
+          <a:p>
+            <a:pPr lvl="1"/>
+            <a:r>
+              <a:rPr lang="en-US"/>
+              <a:t>Second level</a:t>
+            </a:r>
+          </a:p>
+          <a:p>
+            <a:pPr lvl="2"/>
+            <a:r>
+              <a:rPr lang="en-US"/>
+              <a:t>Third level</a:t>
+            </a:r>
+          </a:p>
+          <a:p>
+            <a:pPr lvl="3"/>
+            <a:r>
+              <a:rPr lang="en-US"/>
+              <a:t>Fourth level</a:t>
+            </a:r>
+          </a:p>
+          <a:p>
+            <a:pPr lvl="4"/>
+            <a:r>
+              <a:rPr lang="en-US"/>
+              <a:t>Fifth level</a:t>
+            </a:r>
+          </a:p>
+        </p:txBody>
+      </p:sp>
+      <p:sp>
+        <p:nvSpPr>
+          <p:cNvPr id="6" name="Footer Placeholder 5"/>
+          <p:cNvSpPr>
+            <a:spLocks noGrp="1"/>
+          </p:cNvSpPr>
+          <p:nvPr>
+            <p:ph type="ftr" sz="quarter" idx="4"/>
+          </p:nvPr>
+        </p:nvSpPr>
+        <p:spPr>
+          <a:xfrm>
+            <a:off x="0" y="8685213"/>
+            <a:ext cx="2971800" cy="458787"/>
+          </a:xfrm>
+          <a:prstGeom prst="rect">
+            <a:avLst/>
+          </a:prstGeom>
+        </p:spPr>
+        <p:txBody>
+          <a:bodyPr vert="horz" lIns="91440" tIns="45720" rIns="91440" bIns="45720" rtlCol="0" anchor="b"/>
+          <a:lstStyle>
+            <a:lvl1pPr algn="l">
+              <a:defRPr sz="1200"/>
+            </a:lvl1pPr>
+          </a:lstStyle>
+          <a:p>
+            <a:endParaRPr lang="en-US"/>
+          </a:p>
+        </p:txBody>
+      </p:sp>
+      <p:sp>
+        <p:nvSpPr>
+          <p:cNvPr id="7" name="Slide Number Placeholder 6"/>
+          <p:cNvSpPr>
+            <a:spLocks noGrp="1"/>
+          </p:cNvSpPr>
+          <p:nvPr>
+            <p:ph type="sldNum" sz="quarter" idx="5"/>
+          </p:nvPr>
+        </p:nvSpPr>
+        <p:spPr>
+          <a:xfrm>
+            <a:off x="3884613" y="8685213"/>
+            <a:ext cx="2971800" cy="458787"/>
+          </a:xfrm>
+          <a:prstGeom prst="rect">
+            <a:avLst/>
+          </a:prstGeom>
+        </p:spPr>
+        <p:txBody>
+          <a:bodyPr vert="horz" lIns="91440" tIns="45720" rIns="91440" bIns="45720" rtlCol="0" anchor="b"/>
+          <a:lstStyle>
+            <a:lvl1pPr algn="r">
+              <a:defRPr sz="1200"/>
+            </a:lvl1pPr>
+          </a:lstStyle>
+          <a:p>
+            <a:fld id="{0093A956-BDBD-7C40-876B-4B7D9060FA8D}" type="slidenum">
+              <a:rPr lang="en-US" smtClean="0"/>
+              <a:t>‹#›</a:t>
+            </a:fld>
+            <a:endParaRPr lang="en-US"/>
+          </a:p>
+        </p:txBody>
+      </p:sp>
+    </p:spTree>
+    <p:extLst>
+      <p:ext uri="{BB962C8B-B14F-4D97-AF65-F5344CB8AC3E}">
+        <p14:creationId xmlns:p14="http://schemas.microsoft.com/office/powerpoint/2010/main" val="2279529020"/>
+      </p:ext>
+    </p:extLst>
+  </p:cSld>
+  <p:clrMap bg1="lt1" tx1="dk1" bg2="lt2" tx2="dk2" accent1="accent1" accent2="accent2" accent3="accent3" accent4="accent4" accent5="accent5" accent6="accent6" hlink="hlink" folHlink="folHlink"/>
+  <p:notesStyle>
+    <a:lvl1pPr marL="0" algn="l" defTabSz="914400" rtl="0" eaLnBrk="1" latinLnBrk="0" hangingPunct="1">
+      <a:defRPr sz="1200" kern="1200">
+        <a:solidFill>
+          <a:schemeClr val="tx1"/>
+        </a:solidFill>
+        <a:latin typeface="+mn-lt"/>
+        <a:ea typeface="+mn-ea"/>
+        <a:cs typeface="+mn-cs"/>
+      </a:defRPr>
+    </a:lvl1pPr>
+    <a:lvl2pPr marL="457200" algn="l" defTabSz="914400" rtl="0" eaLnBrk="1" latinLnBrk="0" hangingPunct="1">
+      <a:defRPr sz="1200" kern="1200">
+        <a:solidFill>
+          <a:schemeClr val="tx1"/>
+        </a:solidFill>
+        <a:latin typeface="+mn-lt"/>
+        <a:ea typeface="+mn-ea"/>
+        <a:cs typeface="+mn-cs"/>
+      </a:defRPr>
+    </a:lvl2pPr>
+    <a:lvl3pPr marL="914400" algn="l" defTabSz="914400" rtl="0" eaLnBrk="1" latinLnBrk="0" hangingPunct="1">
+      <a:defRPr sz="1200" kern="1200">
+        <a:solidFill>
+          <a:schemeClr val="tx1"/>
+        </a:solidFill>
+        <a:latin typeface="+mn-lt"/>
+        <a:ea typeface="+mn-ea"/>
+        <a:cs typeface="+mn-cs"/>
+      </a:defRPr>
+    </a:lvl3pPr>
+    <a:lvl4pPr marL="1371600" algn="l" defTabSz="914400" rtl="0" eaLnBrk="1" latinLnBrk="0" hangingPunct="1">
+      <a:defRPr sz="1200" kern="1200">
+        <a:solidFill>
+          <a:schemeClr val="tx1"/>
+        </a:solidFill>
+        <a:latin typeface="+mn-lt"/>
+        <a:ea typeface="+mn-ea"/>
+        <a:cs typeface="+mn-cs"/>
+      </a:defRPr>
+    </a:lvl4pPr>
+    <a:lvl5pPr marL="1828800" algn="l" defTabSz="914400" rtl="0" eaLnBrk="1" latinLnBrk="0" hangingPunct="1">
+      <a:defRPr sz="1200" kern="1200">
+        <a:solidFill>
+          <a:schemeClr val="tx1"/>
+        </a:solidFill>
+        <a:latin typeface="+mn-lt"/>
+        <a:ea typeface="+mn-ea"/>
+        <a:cs typeface="+mn-cs"/>
+      </a:defRPr>
+    </a:lvl5pPr>
+    <a:lvl6pPr marL="2286000" algn="l" defTabSz="914400" rtl="0" eaLnBrk="1" latinLnBrk="0" hangingPunct="1">
+      <a:defRPr sz="1200" kern="1200">
+        <a:solidFill>
+          <a:schemeClr val="tx1"/>
+        </a:solidFill>
+        <a:latin typeface="+mn-lt"/>
+        <a:ea typeface="+mn-ea"/>
+        <a:cs typeface="+mn-cs"/>
+      </a:defRPr>
+    </a:lvl6pPr>
+    <a:lvl7pPr marL="2743200" algn="l" defTabSz="914400" rtl="0" eaLnBrk="1" latinLnBrk="0" hangingPunct="1">
+      <a:defRPr sz="1200" kern="1200">
+        <a:solidFill>
+          <a:schemeClr val="tx1"/>
+        </a:solidFill>
+        <a:latin typeface="+mn-lt"/>
+        <a:ea typeface="+mn-ea"/>
+        <a:cs typeface="+mn-cs"/>
+      </a:defRPr>
+    </a:lvl7pPr>
+    <a:lvl8pPr marL="3200400" algn="l" defTabSz="914400" rtl="0" eaLnBrk="1" latinLnBrk="0" hangingPunct="1">
+      <a:defRPr sz="1200" kern="1200">
+        <a:solidFill>
+          <a:schemeClr val="tx1"/>
+        </a:solidFill>
+        <a:latin typeface="+mn-lt"/>
+        <a:ea typeface="+mn-ea"/>
+        <a:cs typeface="+mn-cs"/>
+      </a:defRPr>
+    </a:lvl8pPr>
+    <a:lvl9pPr marL="3657600" algn="l" defTabSz="914400" rtl="0" eaLnBrk="1" latinLnBrk="0" hangingPunct="1">
+      <a:defRPr sz="1200" kern="1200">
+        <a:solidFill>
+          <a:schemeClr val="tx1"/>
+        </a:solidFill>
+        <a:latin typeface="+mn-lt"/>
+        <a:ea typeface="+mn-ea"/>
+        <a:cs typeface="+mn-cs"/>
+      </a:defRPr>
+    </a:lvl9pPr>
+  </p:notesStyle>
+</p:notesMaster>
+</file>
+
+<file path=ppt/notesSlides/notesSlide1.xml><?xml version="1.0" encoding="utf-8"?>
+<p:notes xmlns:a="http://schemas.openxmlformats.org/drawingml/2006/main" xmlns:r="http://schemas.openxmlformats.org/officeDocument/2006/relationships" xmlns:p="http://schemas.openxmlformats.org/presentationml/2006/main">
+  <p:cSld>
+    <p:spTree>
+      <p:nvGrpSpPr>
+        <p:cNvPr id="1" name=""/>
+        <p:cNvGrpSpPr/>
+        <p:nvPr/>
+      </p:nvGrpSpPr>
+      <p:grpSpPr>
+        <a:xfrm>
+          <a:off x="0" y="0"/>
+          <a:ext cx="0" cy="0"/>
+          <a:chOff x="0" y="0"/>
+          <a:chExt cx="0" cy="0"/>
+        </a:xfrm>
+      </p:grpSpPr>
+      <p:sp>
+        <p:nvSpPr>
+          <p:cNvPr id="2" name="Slide Image Placeholder 1"/>
+          <p:cNvSpPr>
+            <a:spLocks noGrp="1" noRot="1" noChangeAspect="1"/>
+          </p:cNvSpPr>
+          <p:nvPr>
+            <p:ph type="sldImg"/>
+          </p:nvPr>
+        </p:nvSpPr>
+        <p:spPr/>
+      </p:sp>
+      <p:sp>
+        <p:nvSpPr>
+          <p:cNvPr id="3" name="Notes Placeholder 2"/>
+          <p:cNvSpPr>
+            <a:spLocks noGrp="1"/>
+          </p:cNvSpPr>
+          <p:nvPr>
+            <p:ph type="body" idx="1"/>
+          </p:nvPr>
+        </p:nvSpPr>
+        <p:spPr/>
+        <p:txBody>
+          <a:bodyPr/>
+          <a:lstStyle/>
+          <a:p>
+            <a:endParaRPr lang="en-US" dirty="0"/>
+          </a:p>
+        </p:txBody>
+      </p:sp>
+      <p:sp>
+        <p:nvSpPr>
+          <p:cNvPr id="4" name="Slide Number Placeholder 3"/>
+          <p:cNvSpPr>
+            <a:spLocks noGrp="1"/>
+          </p:cNvSpPr>
+          <p:nvPr>
+            <p:ph type="sldNum" sz="quarter" idx="5"/>
+          </p:nvPr>
+        </p:nvSpPr>
+        <p:spPr/>
+        <p:txBody>
+          <a:bodyPr/>
+          <a:lstStyle/>
+          <a:p>
+            <a:fld id="{0093A956-BDBD-7C40-876B-4B7D9060FA8D}" type="slidenum">
+              <a:rPr lang="en-US" smtClean="0"/>
+              <a:t>1</a:t>
+            </a:fld>
+            <a:endParaRPr lang="en-US"/>
+          </a:p>
+        </p:txBody>
+      </p:sp>
+    </p:spTree>
+    <p:extLst>
+      <p:ext uri="{BB962C8B-B14F-4D97-AF65-F5344CB8AC3E}">
+        <p14:creationId xmlns:p14="http://schemas.microsoft.com/office/powerpoint/2010/main" val="3853215297"/>
+      </p:ext>
+    </p:extLst>
+  </p:cSld>
+  <p:clrMapOvr>
+    <a:masterClrMapping/>
+  </p:clrMapOvr>
+</p:notes>
+</file>
+
 <file path=ppt/slideLayouts/slideLayout1.xml><?xml version="1.0" encoding="utf-8"?>
 <p:sldLayout xmlns:a="http://schemas.openxmlformats.org/drawingml/2006/main" xmlns:r="http://schemas.openxmlformats.org/officeDocument/2006/relationships" xmlns:p="http://schemas.openxmlformats.org/presentationml/2006/main" type="title" preserve="1">
   <p:cSld name="Title Slide">
@@ -261,7 +697,7 @@
           <a:p>
             <a:fld id="{38DB27A7-4282-8240-8C28-0071C9F92F15}" type="datetimeFigureOut">
               <a:rPr lang="en-US" smtClean="0"/>
-              <a:t>9/8/22</a:t>
+              <a:t>11/26/22</a:t>
             </a:fld>
             <a:endParaRPr lang="en-US"/>
           </a:p>
@@ -459,7 +895,7 @@
           <a:p>
             <a:fld id="{38DB27A7-4282-8240-8C28-0071C9F92F15}" type="datetimeFigureOut">
               <a:rPr lang="en-US" smtClean="0"/>
-              <a:t>9/8/22</a:t>
+              <a:t>11/26/22</a:t>
             </a:fld>
             <a:endParaRPr lang="en-US"/>
           </a:p>
@@ -667,7 +1103,7 @@
           <a:p>
             <a:fld id="{38DB27A7-4282-8240-8C28-0071C9F92F15}" type="datetimeFigureOut">
               <a:rPr lang="en-US" smtClean="0"/>
-              <a:t>9/8/22</a:t>
+              <a:t>11/26/22</a:t>
             </a:fld>
             <a:endParaRPr lang="en-US"/>
           </a:p>
@@ -865,7 +1301,7 @@
           <a:p>
             <a:fld id="{38DB27A7-4282-8240-8C28-0071C9F92F15}" type="datetimeFigureOut">
               <a:rPr lang="en-US" smtClean="0"/>
-              <a:t>9/8/22</a:t>
+              <a:t>11/26/22</a:t>
             </a:fld>
             <a:endParaRPr lang="en-US"/>
           </a:p>
@@ -1140,7 +1576,7 @@
           <a:p>
             <a:fld id="{38DB27A7-4282-8240-8C28-0071C9F92F15}" type="datetimeFigureOut">
               <a:rPr lang="en-US" smtClean="0"/>
-              <a:t>9/8/22</a:t>
+              <a:t>11/26/22</a:t>
             </a:fld>
             <a:endParaRPr lang="en-US"/>
           </a:p>
@@ -1405,7 +1841,7 @@
           <a:p>
             <a:fld id="{38DB27A7-4282-8240-8C28-0071C9F92F15}" type="datetimeFigureOut">
               <a:rPr lang="en-US" smtClean="0"/>
-              <a:t>9/8/22</a:t>
+              <a:t>11/26/22</a:t>
             </a:fld>
             <a:endParaRPr lang="en-US"/>
           </a:p>
@@ -1817,7 +2253,7 @@
           <a:p>
             <a:fld id="{38DB27A7-4282-8240-8C28-0071C9F92F15}" type="datetimeFigureOut">
               <a:rPr lang="en-US" smtClean="0"/>
-              <a:t>9/8/22</a:t>
+              <a:t>11/26/22</a:t>
             </a:fld>
             <a:endParaRPr lang="en-US"/>
           </a:p>
@@ -1958,7 +2394,7 @@
           <a:p>
             <a:fld id="{38DB27A7-4282-8240-8C28-0071C9F92F15}" type="datetimeFigureOut">
               <a:rPr lang="en-US" smtClean="0"/>
-              <a:t>9/8/22</a:t>
+              <a:t>11/26/22</a:t>
             </a:fld>
             <a:endParaRPr lang="en-US"/>
           </a:p>
@@ -2071,7 +2507,7 @@
           <a:p>
             <a:fld id="{38DB27A7-4282-8240-8C28-0071C9F92F15}" type="datetimeFigureOut">
               <a:rPr lang="en-US" smtClean="0"/>
-              <a:t>9/8/22</a:t>
+              <a:t>11/26/22</a:t>
             </a:fld>
             <a:endParaRPr lang="en-US"/>
           </a:p>
@@ -2382,7 +2818,7 @@
           <a:p>
             <a:fld id="{38DB27A7-4282-8240-8C28-0071C9F92F15}" type="datetimeFigureOut">
               <a:rPr lang="en-US" smtClean="0"/>
-              <a:t>9/8/22</a:t>
+              <a:t>11/26/22</a:t>
             </a:fld>
             <a:endParaRPr lang="en-US"/>
           </a:p>
@@ -2670,7 +3106,7 @@
           <a:p>
             <a:fld id="{38DB27A7-4282-8240-8C28-0071C9F92F15}" type="datetimeFigureOut">
               <a:rPr lang="en-US" smtClean="0"/>
-              <a:t>9/8/22</a:t>
+              <a:t>11/26/22</a:t>
             </a:fld>
             <a:endParaRPr lang="en-US"/>
           </a:p>
@@ -2911,7 +3347,7 @@
           <a:p>
             <a:fld id="{38DB27A7-4282-8240-8C28-0071C9F92F15}" type="datetimeFigureOut">
               <a:rPr lang="en-US" smtClean="0"/>
-              <a:t>9/8/22</a:t>
+              <a:t>11/26/22</a:t>
             </a:fld>
             <a:endParaRPr lang="en-US"/>
           </a:p>
@@ -3314,6 +3750,165 @@
 <file path=ppt/slides/slide1.xml><?xml version="1.0" encoding="utf-8"?>
 <p:sld xmlns:a="http://schemas.openxmlformats.org/drawingml/2006/main" xmlns:r="http://schemas.openxmlformats.org/officeDocument/2006/relationships" xmlns:p="http://schemas.openxmlformats.org/presentationml/2006/main">
   <p:cSld>
+    <p:spTree>
+      <p:nvGrpSpPr>
+        <p:cNvPr id="1" name=""/>
+        <p:cNvGrpSpPr/>
+        <p:nvPr/>
+      </p:nvGrpSpPr>
+      <p:grpSpPr>
+        <a:xfrm>
+          <a:off x="0" y="0"/>
+          <a:ext cx="0" cy="0"/>
+          <a:chOff x="0" y="0"/>
+          <a:chExt cx="0" cy="0"/>
+        </a:xfrm>
+      </p:grpSpPr>
+      <p:pic>
+        <p:nvPicPr>
+          <p:cNvPr id="6" name="Picture 5">
+            <a:extLst>
+              <a:ext uri="{FF2B5EF4-FFF2-40B4-BE49-F238E27FC236}">
+                <a16:creationId xmlns:a16="http://schemas.microsoft.com/office/drawing/2014/main" id="{49447D9C-8530-0E4D-BC98-D11595D1D68F}"/>
+              </a:ext>
+            </a:extLst>
+          </p:cNvPr>
+          <p:cNvPicPr>
+            <a:picLocks noChangeAspect="1"/>
+          </p:cNvPicPr>
+          <p:nvPr/>
+        </p:nvPicPr>
+        <p:blipFill>
+          <a:blip r:embed="rId3"/>
+          <a:stretch>
+            <a:fillRect/>
+          </a:stretch>
+        </p:blipFill>
+        <p:spPr>
+          <a:xfrm>
+            <a:off x="-1910623" y="196066"/>
+            <a:ext cx="10443990" cy="6962660"/>
+          </a:xfrm>
+          <a:prstGeom prst="rect">
+            <a:avLst/>
+          </a:prstGeom>
+        </p:spPr>
+      </p:pic>
+      <p:pic>
+        <p:nvPicPr>
+          <p:cNvPr id="8" name="Picture 7">
+            <a:extLst>
+              <a:ext uri="{FF2B5EF4-FFF2-40B4-BE49-F238E27FC236}">
+                <a16:creationId xmlns:a16="http://schemas.microsoft.com/office/drawing/2014/main" id="{118D8AEF-09D6-A8C3-5F9B-1C1A4788C5AB}"/>
+              </a:ext>
+            </a:extLst>
+          </p:cNvPr>
+          <p:cNvPicPr>
+            <a:picLocks noChangeAspect="1"/>
+          </p:cNvPicPr>
+          <p:nvPr/>
+        </p:nvPicPr>
+        <p:blipFill>
+          <a:blip r:embed="rId4"/>
+          <a:srcRect/>
+          <a:stretch/>
+        </p:blipFill>
+        <p:spPr>
+          <a:xfrm>
+            <a:off x="6096000" y="196066"/>
+            <a:ext cx="6858000" cy="6858000"/>
+          </a:xfrm>
+          <a:prstGeom prst="rect">
+            <a:avLst/>
+          </a:prstGeom>
+        </p:spPr>
+      </p:pic>
+      <p:sp>
+        <p:nvSpPr>
+          <p:cNvPr id="12" name="TextBox 11">
+            <a:extLst>
+              <a:ext uri="{FF2B5EF4-FFF2-40B4-BE49-F238E27FC236}">
+                <a16:creationId xmlns:a16="http://schemas.microsoft.com/office/drawing/2014/main" id="{72FDED6C-57A1-6E56-4E88-A6550617636B}"/>
+              </a:ext>
+            </a:extLst>
+          </p:cNvPr>
+          <p:cNvSpPr txBox="1"/>
+          <p:nvPr/>
+        </p:nvSpPr>
+        <p:spPr>
+          <a:xfrm>
+            <a:off x="2839885" y="196066"/>
+            <a:ext cx="3560915" cy="400110"/>
+          </a:xfrm>
+          <a:prstGeom prst="rect">
+            <a:avLst/>
+          </a:prstGeom>
+          <a:noFill/>
+        </p:spPr>
+        <p:txBody>
+          <a:bodyPr wrap="square" rtlCol="0">
+            <a:spAutoFit/>
+          </a:bodyPr>
+          <a:lstStyle/>
+          <a:p>
+            <a:r>
+              <a:rPr lang="en-US" sz="2000" dirty="0"/>
+              <a:t>a) Individual Trait Information</a:t>
+            </a:r>
+          </a:p>
+        </p:txBody>
+      </p:sp>
+      <p:sp>
+        <p:nvSpPr>
+          <p:cNvPr id="13" name="TextBox 12">
+            <a:extLst>
+              <a:ext uri="{FF2B5EF4-FFF2-40B4-BE49-F238E27FC236}">
+                <a16:creationId xmlns:a16="http://schemas.microsoft.com/office/drawing/2014/main" id="{3A7B4008-61D4-050E-2F4D-D3AEBC23E9E2}"/>
+              </a:ext>
+            </a:extLst>
+          </p:cNvPr>
+          <p:cNvSpPr txBox="1"/>
+          <p:nvPr/>
+        </p:nvSpPr>
+        <p:spPr>
+          <a:xfrm>
+            <a:off x="7492273" y="196066"/>
+            <a:ext cx="3469510" cy="400110"/>
+          </a:xfrm>
+          <a:prstGeom prst="rect">
+            <a:avLst/>
+          </a:prstGeom>
+          <a:noFill/>
+        </p:spPr>
+        <p:txBody>
+          <a:bodyPr wrap="square" rtlCol="0">
+            <a:spAutoFit/>
+          </a:bodyPr>
+          <a:lstStyle/>
+          <a:p>
+            <a:r>
+              <a:rPr lang="en-US" sz="2000" dirty="0"/>
+              <a:t>b) Trait Guilds</a:t>
+            </a:r>
+          </a:p>
+        </p:txBody>
+      </p:sp>
+    </p:spTree>
+    <p:extLst>
+      <p:ext uri="{BB962C8B-B14F-4D97-AF65-F5344CB8AC3E}">
+        <p14:creationId xmlns:p14="http://schemas.microsoft.com/office/powerpoint/2010/main" val="1935581753"/>
+      </p:ext>
+    </p:extLst>
+  </p:cSld>
+  <p:clrMapOvr>
+    <a:masterClrMapping/>
+  </p:clrMapOvr>
+</p:sld>
+</file>
+
+<file path=ppt/slides/slide2.xml><?xml version="1.0" encoding="utf-8"?>
+<p:sld xmlns:a="http://schemas.openxmlformats.org/drawingml/2006/main" xmlns:r="http://schemas.openxmlformats.org/officeDocument/2006/relationships" xmlns:p="http://schemas.openxmlformats.org/presentationml/2006/main">
+  <p:cSld>
     <p:bg>
       <p:bgPr>
         <a:solidFill>
@@ -3667,7 +4262,7 @@
 </p:sld>
 </file>
 
-<file path=ppt/slides/slide2.xml><?xml version="1.0" encoding="utf-8"?>
+<file path=ppt/slides/slide3.xml><?xml version="1.0" encoding="utf-8"?>
 <p:sld xmlns:a="http://schemas.openxmlformats.org/drawingml/2006/main" xmlns:r="http://schemas.openxmlformats.org/officeDocument/2006/relationships" xmlns:p="http://schemas.openxmlformats.org/presentationml/2006/main">
   <p:cSld>
     <p:bg>
@@ -3985,164 +4580,6 @@
     <p:extLst>
       <p:ext uri="{BB962C8B-B14F-4D97-AF65-F5344CB8AC3E}">
         <p14:creationId xmlns:p14="http://schemas.microsoft.com/office/powerpoint/2010/main" val="1944765037"/>
-      </p:ext>
-    </p:extLst>
-  </p:cSld>
-  <p:clrMapOvr>
-    <a:masterClrMapping/>
-  </p:clrMapOvr>
-</p:sld>
-</file>
-
-<file path=ppt/slides/slide3.xml><?xml version="1.0" encoding="utf-8"?>
-<p:sld xmlns:a="http://schemas.openxmlformats.org/drawingml/2006/main" xmlns:r="http://schemas.openxmlformats.org/officeDocument/2006/relationships" xmlns:p="http://schemas.openxmlformats.org/presentationml/2006/main">
-  <p:cSld>
-    <p:spTree>
-      <p:nvGrpSpPr>
-        <p:cNvPr id="1" name=""/>
-        <p:cNvGrpSpPr/>
-        <p:nvPr/>
-      </p:nvGrpSpPr>
-      <p:grpSpPr>
-        <a:xfrm>
-          <a:off x="0" y="0"/>
-          <a:ext cx="0" cy="0"/>
-          <a:chOff x="0" y="0"/>
-          <a:chExt cx="0" cy="0"/>
-        </a:xfrm>
-      </p:grpSpPr>
-      <p:pic>
-        <p:nvPicPr>
-          <p:cNvPr id="5" name="Picture 4">
-            <a:extLst>
-              <a:ext uri="{FF2B5EF4-FFF2-40B4-BE49-F238E27FC236}">
-                <a16:creationId xmlns:a16="http://schemas.microsoft.com/office/drawing/2014/main" id="{83B06B00-D0F0-1309-F45B-DDC8C919B926}"/>
-              </a:ext>
-            </a:extLst>
-          </p:cNvPr>
-          <p:cNvPicPr>
-            <a:picLocks noChangeAspect="1"/>
-          </p:cNvPicPr>
-          <p:nvPr/>
-        </p:nvPicPr>
-        <p:blipFill rotWithShape="1">
-          <a:blip r:embed="rId2"/>
-          <a:srcRect l="11319" r="10764"/>
-          <a:stretch/>
-        </p:blipFill>
-        <p:spPr>
-          <a:xfrm>
-            <a:off x="6848475" y="0"/>
-            <a:ext cx="5343525" cy="6858000"/>
-          </a:xfrm>
-          <a:prstGeom prst="rect">
-            <a:avLst/>
-          </a:prstGeom>
-        </p:spPr>
-      </p:pic>
-      <p:pic>
-        <p:nvPicPr>
-          <p:cNvPr id="9" name="Picture 8">
-            <a:extLst>
-              <a:ext uri="{FF2B5EF4-FFF2-40B4-BE49-F238E27FC236}">
-                <a16:creationId xmlns:a16="http://schemas.microsoft.com/office/drawing/2014/main" id="{838B496A-91C8-EABF-03F0-6D8776E7239E}"/>
-              </a:ext>
-            </a:extLst>
-          </p:cNvPr>
-          <p:cNvPicPr>
-            <a:picLocks noChangeAspect="1"/>
-          </p:cNvPicPr>
-          <p:nvPr/>
-        </p:nvPicPr>
-        <p:blipFill rotWithShape="1">
-          <a:blip r:embed="rId3"/>
-          <a:srcRect r="22176"/>
-          <a:stretch/>
-        </p:blipFill>
-        <p:spPr>
-          <a:xfrm>
-            <a:off x="-1157288" y="0"/>
-            <a:ext cx="8005763" cy="6858000"/>
-          </a:xfrm>
-          <a:prstGeom prst="rect">
-            <a:avLst/>
-          </a:prstGeom>
-        </p:spPr>
-      </p:pic>
-      <p:sp>
-        <p:nvSpPr>
-          <p:cNvPr id="10" name="TextBox 9">
-            <a:extLst>
-              <a:ext uri="{FF2B5EF4-FFF2-40B4-BE49-F238E27FC236}">
-                <a16:creationId xmlns:a16="http://schemas.microsoft.com/office/drawing/2014/main" id="{882166E2-D2D2-B351-CAAB-C968E13B3092}"/>
-              </a:ext>
-            </a:extLst>
-          </p:cNvPr>
-          <p:cNvSpPr txBox="1"/>
-          <p:nvPr/>
-        </p:nvSpPr>
-        <p:spPr>
-          <a:xfrm>
-            <a:off x="385762" y="542925"/>
-            <a:ext cx="471487" cy="400110"/>
-          </a:xfrm>
-          <a:prstGeom prst="rect">
-            <a:avLst/>
-          </a:prstGeom>
-          <a:noFill/>
-        </p:spPr>
-        <p:txBody>
-          <a:bodyPr wrap="square" rtlCol="0">
-            <a:spAutoFit/>
-          </a:bodyPr>
-          <a:lstStyle/>
-          <a:p>
-            <a:r>
-              <a:rPr lang="en-US" sz="2000" dirty="0"/>
-              <a:t>a)</a:t>
-            </a:r>
-          </a:p>
-        </p:txBody>
-      </p:sp>
-      <p:sp>
-        <p:nvSpPr>
-          <p:cNvPr id="11" name="TextBox 10">
-            <a:extLst>
-              <a:ext uri="{FF2B5EF4-FFF2-40B4-BE49-F238E27FC236}">
-                <a16:creationId xmlns:a16="http://schemas.microsoft.com/office/drawing/2014/main" id="{F40ACAAF-C33C-7302-BC1E-CCEC2328FF6B}"/>
-              </a:ext>
-            </a:extLst>
-          </p:cNvPr>
-          <p:cNvSpPr txBox="1"/>
-          <p:nvPr/>
-        </p:nvSpPr>
-        <p:spPr>
-          <a:xfrm>
-            <a:off x="6848475" y="542925"/>
-            <a:ext cx="471487" cy="400110"/>
-          </a:xfrm>
-          <a:prstGeom prst="rect">
-            <a:avLst/>
-          </a:prstGeom>
-          <a:noFill/>
-        </p:spPr>
-        <p:txBody>
-          <a:bodyPr wrap="square" rtlCol="0">
-            <a:spAutoFit/>
-          </a:bodyPr>
-          <a:lstStyle/>
-          <a:p>
-            <a:r>
-              <a:rPr lang="en-US" sz="2000" dirty="0"/>
-              <a:t>b)</a:t>
-            </a:r>
-          </a:p>
-        </p:txBody>
-      </p:sp>
-    </p:spTree>
-    <p:extLst>
-      <p:ext uri="{BB962C8B-B14F-4D97-AF65-F5344CB8AC3E}">
-        <p14:creationId xmlns:p14="http://schemas.microsoft.com/office/powerpoint/2010/main" val="1935581753"/>
       </p:ext>
     </p:extLst>
   </p:cSld>
@@ -4445,4 +4882,299 @@
     </a:ext>
   </a:extLst>
 </a:theme>
+</file>
+
+<file path=ppt/theme/theme2.xml><?xml version="1.0" encoding="utf-8"?>
+<a:theme xmlns:a="http://schemas.openxmlformats.org/drawingml/2006/main" name="Office Theme">
+  <a:themeElements>
+    <a:clrScheme name="Office">
+      <a:dk1>
+        <a:sysClr val="windowText" lastClr="000000"/>
+      </a:dk1>
+      <a:lt1>
+        <a:sysClr val="window" lastClr="FFFFFF"/>
+      </a:lt1>
+      <a:dk2>
+        <a:srgbClr val="44546A"/>
+      </a:dk2>
+      <a:lt2>
+        <a:srgbClr val="E7E6E6"/>
+      </a:lt2>
+      <a:accent1>
+        <a:srgbClr val="4472C4"/>
+      </a:accent1>
+      <a:accent2>
+        <a:srgbClr val="ED7D31"/>
+      </a:accent2>
+      <a:accent3>
+        <a:srgbClr val="A5A5A5"/>
+      </a:accent3>
+      <a:accent4>
+        <a:srgbClr val="FFC000"/>
+      </a:accent4>
+      <a:accent5>
+        <a:srgbClr val="5B9BD5"/>
+      </a:accent5>
+      <a:accent6>
+        <a:srgbClr val="70AD47"/>
+      </a:accent6>
+      <a:hlink>
+        <a:srgbClr val="0563C1"/>
+      </a:hlink>
+      <a:folHlink>
+        <a:srgbClr val="954F72"/>
+      </a:folHlink>
+    </a:clrScheme>
+    <a:fontScheme name="Office">
+      <a:majorFont>
+        <a:latin typeface="Calibri Light" panose="020F0302020204030204"/>
+        <a:ea typeface=""/>
+        <a:cs typeface=""/>
+        <a:font script="Jpan" typeface="游ゴシック Light"/>
+        <a:font script="Hang" typeface="맑은 고딕"/>
+        <a:font script="Hans" typeface="等线 Light"/>
+        <a:font script="Hant" typeface="新細明體"/>
+        <a:font script="Arab" typeface="Times New Roman"/>
+        <a:font script="Hebr" typeface="Times New Roman"/>
+        <a:font script="Thai" typeface="Angsana New"/>
+        <a:font script="Ethi" typeface="Nyala"/>
+        <a:font script="Beng" typeface="Vrinda"/>
+        <a:font script="Gujr" typeface="Shruti"/>
+        <a:font script="Khmr" typeface="MoolBoran"/>
+        <a:font script="Knda" typeface="Tunga"/>
+        <a:font script="Guru" typeface="Raavi"/>
+        <a:font script="Cans" typeface="Euphemia"/>
+        <a:font script="Cher" typeface="Plantagenet Cherokee"/>
+        <a:font script="Yiii" typeface="Microsoft Yi Baiti"/>
+        <a:font script="Tibt" typeface="Microsoft Himalaya"/>
+        <a:font script="Thaa" typeface="MV Boli"/>
+        <a:font script="Deva" typeface="Mangal"/>
+        <a:font script="Telu" typeface="Gautami"/>
+        <a:font script="Taml" typeface="Latha"/>
+        <a:font script="Syrc" typeface="Estrangelo Edessa"/>
+        <a:font script="Orya" typeface="Kalinga"/>
+        <a:font script="Mlym" typeface="Kartika"/>
+        <a:font script="Laoo" typeface="DokChampa"/>
+        <a:font script="Sinh" typeface="Iskoola Pota"/>
+        <a:font script="Mong" typeface="Mongolian Baiti"/>
+        <a:font script="Viet" typeface="Times New Roman"/>
+        <a:font script="Uigh" typeface="Microsoft Uighur"/>
+        <a:font script="Geor" typeface="Sylfaen"/>
+        <a:font script="Armn" typeface="Arial"/>
+        <a:font script="Bugi" typeface="Leelawadee UI"/>
+        <a:font script="Bopo" typeface="Microsoft JhengHei"/>
+        <a:font script="Java" typeface="Javanese Text"/>
+        <a:font script="Lisu" typeface="Segoe UI"/>
+        <a:font script="Mymr" typeface="Myanmar Text"/>
+        <a:font script="Nkoo" typeface="Ebrima"/>
+        <a:font script="Olck" typeface="Nirmala UI"/>
+        <a:font script="Osma" typeface="Ebrima"/>
+        <a:font script="Phag" typeface="Phagspa"/>
+        <a:font script="Syrn" typeface="Estrangelo Edessa"/>
+        <a:font script="Syrj" typeface="Estrangelo Edessa"/>
+        <a:font script="Syre" typeface="Estrangelo Edessa"/>
+        <a:font script="Sora" typeface="Nirmala UI"/>
+        <a:font script="Tale" typeface="Microsoft Tai Le"/>
+        <a:font script="Talu" typeface="Microsoft New Tai Lue"/>
+        <a:font script="Tfng" typeface="Ebrima"/>
+      </a:majorFont>
+      <a:minorFont>
+        <a:latin typeface="Calibri" panose="020F0502020204030204"/>
+        <a:ea typeface=""/>
+        <a:cs typeface=""/>
+        <a:font script="Jpan" typeface="游ゴシック"/>
+        <a:font script="Hang" typeface="맑은 고딕"/>
+        <a:font script="Hans" typeface="等线"/>
+        <a:font script="Hant" typeface="新細明體"/>
+        <a:font script="Arab" typeface="Arial"/>
+        <a:font script="Hebr" typeface="Arial"/>
+        <a:font script="Thai" typeface="Cordia New"/>
+        <a:font script="Ethi" typeface="Nyala"/>
+        <a:font script="Beng" typeface="Vrinda"/>
+        <a:font script="Gujr" typeface="Shruti"/>
+        <a:font script="Khmr" typeface="DaunPenh"/>
+        <a:font script="Knda" typeface="Tunga"/>
+        <a:font script="Guru" typeface="Raavi"/>
+        <a:font script="Cans" typeface="Euphemia"/>
+        <a:font script="Cher" typeface="Plantagenet Cherokee"/>
+        <a:font script="Yiii" typeface="Microsoft Yi Baiti"/>
+        <a:font script="Tibt" typeface="Microsoft Himalaya"/>
+        <a:font script="Thaa" typeface="MV Boli"/>
+        <a:font script="Deva" typeface="Mangal"/>
+        <a:font script="Telu" typeface="Gautami"/>
+        <a:font script="Taml" typeface="Latha"/>
+        <a:font script="Syrc" typeface="Estrangelo Edessa"/>
+        <a:font script="Orya" typeface="Kalinga"/>
+        <a:font script="Mlym" typeface="Kartika"/>
+        <a:font script="Laoo" typeface="DokChampa"/>
+        <a:font script="Sinh" typeface="Iskoola Pota"/>
+        <a:font script="Mong" typeface="Mongolian Baiti"/>
+        <a:font script="Viet" typeface="Arial"/>
+        <a:font script="Uigh" typeface="Microsoft Uighur"/>
+        <a:font script="Geor" typeface="Sylfaen"/>
+        <a:font script="Armn" typeface="Arial"/>
+        <a:font script="Bugi" typeface="Leelawadee UI"/>
+        <a:font script="Bopo" typeface="Microsoft JhengHei"/>
+        <a:font script="Java" typeface="Javanese Text"/>
+        <a:font script="Lisu" typeface="Segoe UI"/>
+        <a:font script="Mymr" typeface="Myanmar Text"/>
+        <a:font script="Nkoo" typeface="Ebrima"/>
+        <a:font script="Olck" typeface="Nirmala UI"/>
+        <a:font script="Osma" typeface="Ebrima"/>
+        <a:font script="Phag" typeface="Phagspa"/>
+        <a:font script="Syrn" typeface="Estrangelo Edessa"/>
+        <a:font script="Syrj" typeface="Estrangelo Edessa"/>
+        <a:font script="Syre" typeface="Estrangelo Edessa"/>
+        <a:font script="Sora" typeface="Nirmala UI"/>
+        <a:font script="Tale" typeface="Microsoft Tai Le"/>
+        <a:font script="Talu" typeface="Microsoft New Tai Lue"/>
+        <a:font script="Tfng" typeface="Ebrima"/>
+      </a:minorFont>
+    </a:fontScheme>
+    <a:fmtScheme name="Office">
+      <a:fillStyleLst>
+        <a:solidFill>
+          <a:schemeClr val="phClr"/>
+        </a:solidFill>
+        <a:gradFill rotWithShape="1">
+          <a:gsLst>
+            <a:gs pos="0">
+              <a:schemeClr val="phClr">
+                <a:lumMod val="110000"/>
+                <a:satMod val="105000"/>
+                <a:tint val="67000"/>
+              </a:schemeClr>
+            </a:gs>
+            <a:gs pos="50000">
+              <a:schemeClr val="phClr">
+                <a:lumMod val="105000"/>
+                <a:satMod val="103000"/>
+                <a:tint val="73000"/>
+              </a:schemeClr>
+            </a:gs>
+            <a:gs pos="100000">
+              <a:schemeClr val="phClr">
+                <a:lumMod val="105000"/>
+                <a:satMod val="109000"/>
+                <a:tint val="81000"/>
+              </a:schemeClr>
+            </a:gs>
+          </a:gsLst>
+          <a:lin ang="5400000" scaled="0"/>
+        </a:gradFill>
+        <a:gradFill rotWithShape="1">
+          <a:gsLst>
+            <a:gs pos="0">
+              <a:schemeClr val="phClr">
+                <a:satMod val="103000"/>
+                <a:lumMod val="102000"/>
+                <a:tint val="94000"/>
+              </a:schemeClr>
+            </a:gs>
+            <a:gs pos="50000">
+              <a:schemeClr val="phClr">
+                <a:satMod val="110000"/>
+                <a:lumMod val="100000"/>
+                <a:shade val="100000"/>
+              </a:schemeClr>
+            </a:gs>
+            <a:gs pos="100000">
+              <a:schemeClr val="phClr">
+                <a:lumMod val="99000"/>
+                <a:satMod val="120000"/>
+                <a:shade val="78000"/>
+              </a:schemeClr>
+            </a:gs>
+          </a:gsLst>
+          <a:lin ang="5400000" scaled="0"/>
+        </a:gradFill>
+      </a:fillStyleLst>
+      <a:lnStyleLst>
+        <a:ln w="6350" cap="flat" cmpd="sng" algn="ctr">
+          <a:solidFill>
+            <a:schemeClr val="phClr"/>
+          </a:solidFill>
+          <a:prstDash val="solid"/>
+          <a:miter lim="800000"/>
+        </a:ln>
+        <a:ln w="12700" cap="flat" cmpd="sng" algn="ctr">
+          <a:solidFill>
+            <a:schemeClr val="phClr"/>
+          </a:solidFill>
+          <a:prstDash val="solid"/>
+          <a:miter lim="800000"/>
+        </a:ln>
+        <a:ln w="19050" cap="flat" cmpd="sng" algn="ctr">
+          <a:solidFill>
+            <a:schemeClr val="phClr"/>
+          </a:solidFill>
+          <a:prstDash val="solid"/>
+          <a:miter lim="800000"/>
+        </a:ln>
+      </a:lnStyleLst>
+      <a:effectStyleLst>
+        <a:effectStyle>
+          <a:effectLst/>
+        </a:effectStyle>
+        <a:effectStyle>
+          <a:effectLst/>
+        </a:effectStyle>
+        <a:effectStyle>
+          <a:effectLst>
+            <a:outerShdw blurRad="57150" dist="19050" dir="5400000" algn="ctr" rotWithShape="0">
+              <a:srgbClr val="000000">
+                <a:alpha val="63000"/>
+              </a:srgbClr>
+            </a:outerShdw>
+          </a:effectLst>
+        </a:effectStyle>
+      </a:effectStyleLst>
+      <a:bgFillStyleLst>
+        <a:solidFill>
+          <a:schemeClr val="phClr"/>
+        </a:solidFill>
+        <a:solidFill>
+          <a:schemeClr val="phClr">
+            <a:tint val="95000"/>
+            <a:satMod val="170000"/>
+          </a:schemeClr>
+        </a:solidFill>
+        <a:gradFill rotWithShape="1">
+          <a:gsLst>
+            <a:gs pos="0">
+              <a:schemeClr val="phClr">
+                <a:tint val="93000"/>
+                <a:satMod val="150000"/>
+                <a:shade val="98000"/>
+                <a:lumMod val="102000"/>
+              </a:schemeClr>
+            </a:gs>
+            <a:gs pos="50000">
+              <a:schemeClr val="phClr">
+                <a:tint val="98000"/>
+                <a:satMod val="130000"/>
+                <a:shade val="90000"/>
+                <a:lumMod val="103000"/>
+              </a:schemeClr>
+            </a:gs>
+            <a:gs pos="100000">
+              <a:schemeClr val="phClr">
+                <a:shade val="63000"/>
+                <a:satMod val="120000"/>
+              </a:schemeClr>
+            </a:gs>
+          </a:gsLst>
+          <a:lin ang="5400000" scaled="0"/>
+        </a:gradFill>
+      </a:bgFillStyleLst>
+    </a:fmtScheme>
+  </a:themeElements>
+  <a:objectDefaults/>
+  <a:extraClrSchemeLst/>
+  <a:extLst>
+    <a:ext uri="{05A4C25C-085E-4340-85A3-A5531E510DB2}">
+      <thm15:themeFamily xmlns:thm15="http://schemas.microsoft.com/office/thememl/2012/main" name="Office Theme" id="{62F939B6-93AF-4DB8-9C6B-D6C7DFDC589F}" vid="{4A3C46E8-61CC-4603-A589-7422A47A8E4A}"/>
+    </a:ext>
+  </a:extLst>
+</a:theme>
 </file>
</xml_diff>